<commit_message>
docs: update presentation files for incident prediction
</commit_message>
<xml_diff>
--- a/docs/Previsao_Incidentes_Final.pptx
+++ b/docs/Previsao_Incidentes_Final.pptx
@@ -5,8 +5,8 @@
     <p:sldMasterId id="2147483648" r:id="rId1"/>
   </p:sldMasterIdLst>
   <p:sldIdLst>
-    <p:sldId id="256" r:id="rId7"/>
-    <p:sldId id="257" r:id="rId8"/>
+    <p:sldId id="256" r:id="rId2"/>
+    <p:sldId id="257" r:id="rId3"/>
   </p:sldIdLst>
   <p:sldSz cx="9144000" cy="6858000" type="screen4x3"/>
   <p:notesSz cx="6858000" cy="9144000"/>
@@ -105,6 +105,22 @@
       </a:defRPr>
     </a:lvl9pPr>
   </p:defaultTextStyle>
+  <p:extLst>
+    <p:ext uri="{EFAFB233-063F-42B5-8137-9DF3F51BA10A}">
+      <p15:sldGuideLst xmlns:p15="http://schemas.microsoft.com/office/powerpoint/2012/main">
+        <p15:guide id="1" orient="horz" pos="2160">
+          <p15:clr>
+            <a:srgbClr val="A4A3A4"/>
+          </p15:clr>
+        </p15:guide>
+        <p15:guide id="2" pos="2880">
+          <p15:clr>
+            <a:srgbClr val="A4A3A4"/>
+          </p15:clr>
+        </p15:guide>
+      </p15:sldGuideLst>
+    </p:ext>
+  </p:extLst>
 </p:presentation>
 </file>
 
@@ -289,7 +305,7 @@
           <a:p>
             <a:fld id="{5BCAD085-E8A6-8845-BD4E-CB4CCA059FC4}" type="datetimeFigureOut">
               <a:rPr lang="en-US" smtClean="0"/>
-              <a:t>1/27/13</a:t>
+              <a:t>2025-11-29</a:t>
             </a:fld>
             <a:endParaRPr lang="en-US"/>
           </a:p>
@@ -459,7 +475,7 @@
           <a:p>
             <a:fld id="{5BCAD085-E8A6-8845-BD4E-CB4CCA059FC4}" type="datetimeFigureOut">
               <a:rPr lang="en-US" smtClean="0"/>
-              <a:t>1/27/13</a:t>
+              <a:t>2025-11-29</a:t>
             </a:fld>
             <a:endParaRPr lang="en-US"/>
           </a:p>
@@ -639,7 +655,7 @@
           <a:p>
             <a:fld id="{5BCAD085-E8A6-8845-BD4E-CB4CCA059FC4}" type="datetimeFigureOut">
               <a:rPr lang="en-US" smtClean="0"/>
-              <a:t>1/27/13</a:t>
+              <a:t>2025-11-29</a:t>
             </a:fld>
             <a:endParaRPr lang="en-US"/>
           </a:p>
@@ -809,7 +825,7 @@
           <a:p>
             <a:fld id="{5BCAD085-E8A6-8845-BD4E-CB4CCA059FC4}" type="datetimeFigureOut">
               <a:rPr lang="en-US" smtClean="0"/>
-              <a:t>1/27/13</a:t>
+              <a:t>2025-11-29</a:t>
             </a:fld>
             <a:endParaRPr lang="en-US"/>
           </a:p>
@@ -1055,7 +1071,7 @@
           <a:p>
             <a:fld id="{5BCAD085-E8A6-8845-BD4E-CB4CCA059FC4}" type="datetimeFigureOut">
               <a:rPr lang="en-US" smtClean="0"/>
-              <a:t>1/27/13</a:t>
+              <a:t>2025-11-29</a:t>
             </a:fld>
             <a:endParaRPr lang="en-US"/>
           </a:p>
@@ -1343,7 +1359,7 @@
           <a:p>
             <a:fld id="{5BCAD085-E8A6-8845-BD4E-CB4CCA059FC4}" type="datetimeFigureOut">
               <a:rPr lang="en-US" smtClean="0"/>
-              <a:t>1/27/13</a:t>
+              <a:t>2025-11-29</a:t>
             </a:fld>
             <a:endParaRPr lang="en-US"/>
           </a:p>
@@ -1765,7 +1781,7 @@
           <a:p>
             <a:fld id="{5BCAD085-E8A6-8845-BD4E-CB4CCA059FC4}" type="datetimeFigureOut">
               <a:rPr lang="en-US" smtClean="0"/>
-              <a:t>1/27/13</a:t>
+              <a:t>2025-11-29</a:t>
             </a:fld>
             <a:endParaRPr lang="en-US"/>
           </a:p>
@@ -1883,7 +1899,7 @@
           <a:p>
             <a:fld id="{5BCAD085-E8A6-8845-BD4E-CB4CCA059FC4}" type="datetimeFigureOut">
               <a:rPr lang="en-US" smtClean="0"/>
-              <a:t>1/27/13</a:t>
+              <a:t>2025-11-29</a:t>
             </a:fld>
             <a:endParaRPr lang="en-US"/>
           </a:p>
@@ -1978,7 +1994,7 @@
           <a:p>
             <a:fld id="{5BCAD085-E8A6-8845-BD4E-CB4CCA059FC4}" type="datetimeFigureOut">
               <a:rPr lang="en-US" smtClean="0"/>
-              <a:t>1/27/13</a:t>
+              <a:t>2025-11-29</a:t>
             </a:fld>
             <a:endParaRPr lang="en-US"/>
           </a:p>
@@ -2255,7 +2271,7 @@
           <a:p>
             <a:fld id="{5BCAD085-E8A6-8845-BD4E-CB4CCA059FC4}" type="datetimeFigureOut">
               <a:rPr lang="en-US" smtClean="0"/>
-              <a:t>1/27/13</a:t>
+              <a:t>2025-11-29</a:t>
             </a:fld>
             <a:endParaRPr lang="en-US"/>
           </a:p>
@@ -2508,7 +2524,7 @@
           <a:p>
             <a:fld id="{5BCAD085-E8A6-8845-BD4E-CB4CCA059FC4}" type="datetimeFigureOut">
               <a:rPr lang="en-US" smtClean="0"/>
-              <a:t>1/27/13</a:t>
+              <a:t>2025-11-29</a:t>
             </a:fld>
             <a:endParaRPr lang="en-US"/>
           </a:p>
@@ -2721,7 +2737,7 @@
           <a:p>
             <a:fld id="{5BCAD085-E8A6-8845-BD4E-CB4CCA059FC4}" type="datetimeFigureOut">
               <a:rPr lang="en-US" smtClean="0"/>
-              <a:t>1/27/13</a:t>
+              <a:t>2025-11-29</a:t>
             </a:fld>
             <a:endParaRPr lang="en-US"/>
           </a:p>
@@ -3080,7 +3096,7 @@
 </file>
 
 <file path=ppt/slides/slide1.xml><?xml version="1.0" encoding="utf-8"?>
-<p:sld xmlns:a="http://schemas.openxmlformats.org/drawingml/2006/main" xmlns:p="http://schemas.openxmlformats.org/presentationml/2006/main" xmlns:r="http://schemas.openxmlformats.org/officeDocument/2006/relationships">
+<p:sld xmlns:a="http://schemas.openxmlformats.org/drawingml/2006/main" xmlns:r="http://schemas.openxmlformats.org/officeDocument/2006/relationships" xmlns:p="http://schemas.openxmlformats.org/presentationml/2006/main">
   <p:cSld>
     <p:spTree>
       <p:nvGrpSpPr>
@@ -3088,7 +3104,14 @@
         <p:cNvGrpSpPr/>
         <p:nvPr/>
       </p:nvGrpSpPr>
-      <p:grpSpPr/>
+      <p:grpSpPr>
+        <a:xfrm>
+          <a:off x="0" y="0"/>
+          <a:ext cx="0" cy="0"/>
+          <a:chOff x="0" y="0"/>
+          <a:chExt cx="0" cy="0"/>
+        </a:xfrm>
+      </p:grpSpPr>
       <p:sp>
         <p:nvSpPr>
           <p:cNvPr id="2" name="Title 1"/>
@@ -3099,9 +3122,16 @@
             <p:ph type="ctrTitle"/>
           </p:nvPr>
         </p:nvSpPr>
-        <p:spPr/>
-        <p:txBody>
-          <a:bodyPr/>
+        <p:spPr>
+          <a:xfrm>
+            <a:off x="702860" y="1395412"/>
+            <a:ext cx="7772400" cy="1470025"/>
+          </a:xfrm>
+        </p:spPr>
+        <p:txBody>
+          <a:bodyPr>
+            <a:normAutofit fontScale="90000"/>
+          </a:bodyPr>
           <a:lstStyle/>
           <a:p>
             <a:pPr>
@@ -3112,7 +3142,52 @@
               </a:defRPr>
             </a:pPr>
             <a:r>
-              <a:t>Previsão de Incidentes em Períodos Pós-Eleitorais Usando Machine Learning</a:t>
+              <a:rPr dirty="0" err="1"/>
+              <a:t>Previsão</a:t>
+            </a:r>
+            <a:r>
+              <a:rPr dirty="0"/>
+              <a:t> de </a:t>
+            </a:r>
+            <a:r>
+              <a:rPr dirty="0" err="1"/>
+              <a:t>Incidentes</a:t>
+            </a:r>
+            <a:r>
+              <a:rPr dirty="0"/>
+              <a:t> </a:t>
+            </a:r>
+            <a:r>
+              <a:rPr dirty="0" err="1"/>
+              <a:t>em</a:t>
+            </a:r>
+            <a:r>
+              <a:rPr dirty="0"/>
+              <a:t> </a:t>
+            </a:r>
+            <a:r>
+              <a:rPr dirty="0" err="1"/>
+              <a:t>Períodos</a:t>
+            </a:r>
+            <a:r>
+              <a:rPr dirty="0"/>
+              <a:t> </a:t>
+            </a:r>
+            <a:r>
+              <a:rPr dirty="0" err="1"/>
+              <a:t>Pós-Eleitorais</a:t>
+            </a:r>
+            <a:r>
+              <a:rPr dirty="0"/>
+              <a:t> </a:t>
+            </a:r>
+            <a:r>
+              <a:rPr dirty="0" err="1"/>
+              <a:t>Usando</a:t>
+            </a:r>
+            <a:r>
+              <a:rPr dirty="0"/>
+              <a:t> Machine Learning</a:t>
             </a:r>
           </a:p>
         </p:txBody>
@@ -3129,7 +3204,9 @@
         </p:nvSpPr>
         <p:spPr/>
         <p:txBody>
-          <a:bodyPr/>
+          <a:bodyPr>
+            <a:normAutofit fontScale="55000" lnSpcReduction="20000"/>
+          </a:bodyPr>
           <a:lstStyle/>
           <a:p>
             <a:pPr>
@@ -3143,7 +3220,9 @@
               <a:t>Transformando dados em poder de antecipação</a:t>
             </a:r>
           </a:p>
-          <a:p/>
+          <a:p>
+            <a:endParaRPr/>
+          </a:p>
           <a:p>
             <a:r>
               <a:t>Autores:</a:t>
@@ -3175,7 +3254,7 @@
 </file>
 
 <file path=ppt/slides/slide2.xml><?xml version="1.0" encoding="utf-8"?>
-<p:sld xmlns:a="http://schemas.openxmlformats.org/drawingml/2006/main" xmlns:p="http://schemas.openxmlformats.org/presentationml/2006/main" xmlns:r="http://schemas.openxmlformats.org/officeDocument/2006/relationships">
+<p:sld xmlns:a="http://schemas.openxmlformats.org/drawingml/2006/main" xmlns:r="http://schemas.openxmlformats.org/officeDocument/2006/relationships" xmlns:p="http://schemas.openxmlformats.org/presentationml/2006/main">
   <p:cSld>
     <p:spTree>
       <p:nvGrpSpPr>
@@ -3183,7 +3262,14 @@
         <p:cNvGrpSpPr/>
         <p:nvPr/>
       </p:nvGrpSpPr>
-      <p:grpSpPr/>
+      <p:grpSpPr>
+        <a:xfrm>
+          <a:off x="0" y="0"/>
+          <a:ext cx="0" cy="0"/>
+          <a:chOff x="0" y="0"/>
+          <a:chExt cx="0" cy="0"/>
+        </a:xfrm>
+      </p:grpSpPr>
       <p:sp>
         <p:nvSpPr>
           <p:cNvPr id="2" name="Title 1"/>
@@ -3219,7 +3305,9 @@
         <p:txBody>
           <a:bodyPr/>
           <a:lstStyle/>
-          <a:p/>
+          <a:p>
+            <a:endParaRPr/>
+          </a:p>
         </p:txBody>
       </p:sp>
       <p:pic>

</xml_diff>